<commit_message>
arduino ajuste 06/09/2024 2024.2
</commit_message>
<xml_diff>
--- a/01 Classes/Aula 03.1 - Programação Microcontroladores - Arduino Tinkercad - Prática.pptx
+++ b/01 Classes/Aula 03.1 - Programação Microcontroladores - Arduino Tinkercad - Prática.pptx
@@ -11251,8 +11251,8 @@
         </p:nvSpPr>
         <p:spPr>
           <a:xfrm>
-            <a:off x="3770767" y="1063231"/>
-            <a:ext cx="5230368" cy="2246769"/>
+            <a:off x="3770767" y="914400"/>
+            <a:ext cx="5230368" cy="1938992"/>
           </a:xfrm>
           <a:prstGeom prst="rect">
             <a:avLst/>
@@ -11311,19 +11311,7 @@
                 <a:latin typeface="Times New Roman" panose="02020603050405020304" pitchFamily="18" charset="0"/>
                 <a:cs typeface="Times New Roman" panose="02020603050405020304" pitchFamily="18" charset="0"/>
               </a:rPr>
-              <a:t>()</a:t>
-            </a:r>
-          </a:p>
-          <a:p>
-            <a:pPr marL="0" indent="0">
-              <a:buNone/>
-            </a:pPr>
-            <a:r>
-              <a:rPr lang="pt-BR" sz="2000" dirty="0">
-                <a:latin typeface="Times New Roman" panose="02020603050405020304" pitchFamily="18" charset="0"/>
-                <a:cs typeface="Times New Roman" panose="02020603050405020304" pitchFamily="18" charset="0"/>
-              </a:rPr>
-              <a:t>{</a:t>
+              <a:t>() {</a:t>
             </a:r>
           </a:p>
           <a:p>
@@ -11570,7 +11558,7 @@
         </p:nvSpPr>
         <p:spPr>
           <a:xfrm>
-            <a:off x="3770767" y="3279756"/>
+            <a:off x="3770767" y="2809073"/>
             <a:ext cx="4978908" cy="1754326"/>
           </a:xfrm>
           <a:prstGeom prst="rect">
@@ -11719,7 +11707,7 @@
                 <a:latin typeface="Times New Roman" panose="02020603050405020304" pitchFamily="18" charset="0"/>
                 <a:cs typeface="Times New Roman" panose="02020603050405020304" pitchFamily="18" charset="0"/>
               </a:rPr>
-              <a:t>Terminal + bateria 5V</a:t>
+              <a:t>Terminal + da bateria 9V, liga na Lâmpada</a:t>
             </a:r>
             <a:endParaRPr lang="pt-BR" sz="1800" b="1" dirty="0">
               <a:latin typeface="Times New Roman" panose="02020603050405020304" pitchFamily="18" charset="0"/>

</xml_diff>

<commit_message>
arduino ajuste 10/09/2024 2024.2
</commit_message>
<xml_diff>
--- a/01 Classes/Aula 03.1 - Programação Microcontroladores - Arduino Tinkercad - Prática.pptx
+++ b/01 Classes/Aula 03.1 - Programação Microcontroladores - Arduino Tinkercad - Prática.pptx
@@ -5068,20 +5068,27 @@
                 <a:latin typeface="Times New Roman" panose="02020603050405020304" pitchFamily="18" charset="0"/>
                 <a:cs typeface="Times New Roman" panose="02020603050405020304" pitchFamily="18" charset="0"/>
               </a:rPr>
-              <a:t>SDA =&gt; </a:t>
-            </a:r>
-            <a:r>
-              <a:rPr lang="pt-BR" sz="1800" b="1" dirty="0">
+              <a:t>SDA </a:t>
+            </a:r>
+            <a:r>
+              <a:rPr lang="pt-BR" sz="1800" b="1">
+                <a:latin typeface="Times New Roman" panose="02020603050405020304" pitchFamily="18" charset="0"/>
+                <a:cs typeface="Times New Roman" panose="02020603050405020304" pitchFamily="18" charset="0"/>
+              </a:rPr>
+              <a:t>=&gt; </a:t>
+            </a:r>
+            <a:r>
+              <a:rPr lang="pt-BR" sz="1800" b="1">
                 <a:solidFill>
                   <a:srgbClr val="0070C0"/>
                 </a:solidFill>
                 <a:latin typeface="Times New Roman" panose="02020603050405020304" pitchFamily="18" charset="0"/>
                 <a:cs typeface="Times New Roman" panose="02020603050405020304" pitchFamily="18" charset="0"/>
               </a:rPr>
-              <a:t>A6</a:t>
-            </a:r>
-            <a:r>
-              <a:rPr lang="pt-BR" sz="1800" b="1" dirty="0">
+              <a:t>A4</a:t>
+            </a:r>
+            <a:r>
+              <a:rPr lang="pt-BR" sz="1800" b="1">
                 <a:latin typeface="Times New Roman" panose="02020603050405020304" pitchFamily="18" charset="0"/>
                 <a:cs typeface="Times New Roman" panose="02020603050405020304" pitchFamily="18" charset="0"/>
               </a:rPr>

</xml_diff>